<commit_message>
Final de semana 1
</commit_message>
<xml_diff>
--- a/Clase1/Presentación.pptx
+++ b/Clase1/Presentación.pptx
@@ -3837,8 +3837,12 @@
           <a:lstStyle/>
           <a:p>
             <a:r>
-              <a:rPr lang="es-ES" dirty="0" smtClean="0"/>
-              <a:t>Semana 2</a:t>
+              <a:rPr lang="es-ES" smtClean="0"/>
+              <a:t>Semana </a:t>
+            </a:r>
+            <a:r>
+              <a:rPr lang="es-ES" smtClean="0"/>
+              <a:t>1</a:t>
             </a:r>
             <a:endParaRPr lang="es-CO" dirty="0"/>
           </a:p>
@@ -7350,11 +7354,7 @@
           <a:p>
             <a:r>
               <a:rPr lang="es-ES" dirty="0" smtClean="0"/>
-              <a:t>¿Cuál es la dirección de subred</a:t>
-            </a:r>
-            <a:r>
-              <a:rPr lang="es-ES" dirty="0" smtClean="0"/>
-              <a:t>?</a:t>
+              <a:t>¿Cuál es la dirección de subred?</a:t>
             </a:r>
             <a:endParaRPr lang="es-CO" dirty="0"/>
           </a:p>
@@ -8823,11 +8823,7 @@
           <a:p>
             <a:r>
               <a:rPr lang="es-ES" sz="2400" dirty="0" smtClean="0"/>
-              <a:t>El </a:t>
-            </a:r>
-            <a:r>
-              <a:rPr lang="es-ES" sz="2400" dirty="0" smtClean="0"/>
-              <a:t>hilo tiene que reportar a la interfaz cada vez que encuentre un host</a:t>
+              <a:t>El hilo tiene que reportar a la interfaz cada vez que encuentre un host</a:t>
             </a:r>
             <a:endParaRPr lang="es-CO" sz="2400" dirty="0" smtClean="0"/>
           </a:p>

</xml_diff>